<commit_message>
modified:   exo32_01_10.pdf modified:   exo32_01_10.pptx modified:   exo32_15_35.pdf modified:   exo32_15_35.pptx
</commit_message>
<xml_diff>
--- a/ppt/Exodus/exo32_15_35.pptx
+++ b/ppt/Exodus/exo32_15_35.pptx
@@ -235,7 +235,7 @@
           <a:p>
             <a:fld id="{3EFD42F7-718C-4B98-AAEC-167E6DDD60A7}" type="datetimeFigureOut">
               <a:rPr lang="en-US" smtClean="0"/>
-              <a:t>9/21/25</a:t>
+              <a:t>9/22/25</a:t>
             </a:fld>
             <a:endParaRPr lang="en-US"/>
           </a:p>
@@ -675,7 +675,7 @@
           <a:p>
             <a:fld id="{63A1C593-65D0-4073-BCC9-577B9352EA97}" type="datetimeFigureOut">
               <a:rPr lang="en-US" smtClean="0"/>
-              <a:t>9/21/25</a:t>
+              <a:t>9/22/25</a:t>
             </a:fld>
             <a:endParaRPr lang="en-US"/>
           </a:p>
@@ -921,7 +921,7 @@
           <a:p>
             <a:fld id="{63A1C593-65D0-4073-BCC9-577B9352EA97}" type="datetimeFigureOut">
               <a:rPr lang="en-US" smtClean="0"/>
-              <a:t>9/21/25</a:t>
+              <a:t>9/22/25</a:t>
             </a:fld>
             <a:endParaRPr lang="en-US"/>
           </a:p>
@@ -1095,7 +1095,7 @@
           <a:p>
             <a:fld id="{63A1C593-65D0-4073-BCC9-577B9352EA97}" type="datetimeFigureOut">
               <a:rPr lang="en-US" smtClean="0"/>
-              <a:t>9/21/25</a:t>
+              <a:t>9/22/25</a:t>
             </a:fld>
             <a:endParaRPr lang="en-US"/>
           </a:p>
@@ -1422,7 +1422,7 @@
           <a:p>
             <a:fld id="{63A1C593-65D0-4073-BCC9-577B9352EA97}" type="datetimeFigureOut">
               <a:rPr lang="en-US" smtClean="0"/>
-              <a:t>9/21/25</a:t>
+              <a:t>9/22/25</a:t>
             </a:fld>
             <a:endParaRPr lang="en-US"/>
           </a:p>
@@ -1609,7 +1609,7 @@
           <a:p>
             <a:fld id="{63A1C593-65D0-4073-BCC9-577B9352EA97}" type="datetimeFigureOut">
               <a:rPr lang="en-US" smtClean="0"/>
-              <a:t>9/21/25</a:t>
+              <a:t>9/22/25</a:t>
             </a:fld>
             <a:endParaRPr lang="en-US"/>
           </a:p>
@@ -1834,7 +1834,7 @@
           <a:p>
             <a:fld id="{63A1C593-65D0-4073-BCC9-577B9352EA97}" type="datetimeFigureOut">
               <a:rPr lang="en-US" smtClean="0"/>
-              <a:t>9/21/25</a:t>
+              <a:t>9/22/25</a:t>
             </a:fld>
             <a:endParaRPr lang="en-US"/>
           </a:p>
@@ -2194,7 +2194,7 @@
           <a:p>
             <a:fld id="{63A1C593-65D0-4073-BCC9-577B9352EA97}" type="datetimeFigureOut">
               <a:rPr lang="en-US" smtClean="0"/>
-              <a:t>9/21/25</a:t>
+              <a:t>9/22/25</a:t>
             </a:fld>
             <a:endParaRPr lang="en-US"/>
           </a:p>
@@ -2307,7 +2307,7 @@
           <a:p>
             <a:fld id="{63A1C593-65D0-4073-BCC9-577B9352EA97}" type="datetimeFigureOut">
               <a:rPr lang="en-US" smtClean="0"/>
-              <a:t>9/21/25</a:t>
+              <a:t>9/22/25</a:t>
             </a:fld>
             <a:endParaRPr lang="en-US"/>
           </a:p>
@@ -2398,7 +2398,7 @@
           <a:p>
             <a:fld id="{63A1C593-65D0-4073-BCC9-577B9352EA97}" type="datetimeFigureOut">
               <a:rPr lang="en-US" smtClean="0"/>
-              <a:t>9/21/25</a:t>
+              <a:t>9/22/25</a:t>
             </a:fld>
             <a:endParaRPr lang="en-US"/>
           </a:p>
@@ -2669,7 +2669,7 @@
           <a:p>
             <a:fld id="{63A1C593-65D0-4073-BCC9-577B9352EA97}" type="datetimeFigureOut">
               <a:rPr lang="en-US" smtClean="0"/>
-              <a:t>9/21/25</a:t>
+              <a:t>9/22/25</a:t>
             </a:fld>
             <a:endParaRPr lang="en-US"/>
           </a:p>
@@ -2946,7 +2946,7 @@
           <a:p>
             <a:fld id="{63A1C593-65D0-4073-BCC9-577B9352EA97}" type="datetimeFigureOut">
               <a:rPr lang="en-US" smtClean="0"/>
-              <a:t>9/21/25</a:t>
+              <a:t>9/22/25</a:t>
             </a:fld>
             <a:endParaRPr lang="en-US"/>
           </a:p>
@@ -3216,7 +3216,7 @@
           <a:p>
             <a:fld id="{63A1C593-65D0-4073-BCC9-577B9352EA97}" type="datetimeFigureOut">
               <a:rPr lang="en-US" smtClean="0"/>
-              <a:t>9/21/25</a:t>
+              <a:t>9/22/25</a:t>
             </a:fld>
             <a:endParaRPr lang="en-US"/>
           </a:p>
@@ -6222,7 +6222,7 @@
             <a:pPr algn="ctr"/>
             <a:r>
               <a:rPr lang="en-US" altLang="zh-CN" dirty="0"/>
-              <a:t>Which Consequence is the Most Significant?</a:t>
+              <a:t>Which Consequence is the Most Painful?</a:t>
             </a:r>
             <a:endParaRPr lang="zh-CN" altLang="en-US" dirty="0"/>
           </a:p>
@@ -6301,6 +6301,183 @@
           </a:p>
           <a:p>
             <a:endParaRPr lang="en-US" sz="1800" dirty="0"/>
+          </a:p>
+        </p:txBody>
+      </p:sp>
+      <p:sp>
+        <p:nvSpPr>
+          <p:cNvPr id="3" name="Title 1">
+            <a:extLst>
+              <a:ext uri="{FF2B5EF4-FFF2-40B4-BE49-F238E27FC236}">
+                <a16:creationId xmlns:a16="http://schemas.microsoft.com/office/drawing/2014/main" id="{0350F53B-39D6-19A7-320D-BE4DA8B5B4F4}"/>
+              </a:ext>
+            </a:extLst>
+          </p:cNvPr>
+          <p:cNvSpPr txBox="1">
+            <a:spLocks/>
+          </p:cNvSpPr>
+          <p:nvPr/>
+        </p:nvSpPr>
+        <p:spPr>
+          <a:xfrm>
+            <a:off x="463062" y="1055948"/>
+            <a:ext cx="10972800" cy="582613"/>
+          </a:xfrm>
+          <a:prstGeom prst="rect">
+            <a:avLst/>
+          </a:prstGeom>
+          <a:noFill/>
+          <a:ln w="9525">
+            <a:noFill/>
+          </a:ln>
+        </p:spPr>
+        <p:txBody>
+          <a:bodyPr anchor="ctr" anchorCtr="0"/>
+          <a:lstStyle>
+            <a:lvl1pPr algn="l" rtl="0" fontAlgn="base">
+              <a:spcBef>
+                <a:spcPct val="0"/>
+              </a:spcBef>
+              <a:spcAft>
+                <a:spcPct val="0"/>
+              </a:spcAft>
+              <a:defRPr sz="3600" kern="1200">
+                <a:solidFill>
+                  <a:schemeClr val="tx1"/>
+                </a:solidFill>
+                <a:latin typeface="+mj-lt"/>
+                <a:ea typeface="+mj-ea"/>
+                <a:cs typeface="+mj-cs"/>
+              </a:defRPr>
+            </a:lvl1pPr>
+            <a:lvl2pPr algn="l" rtl="0" fontAlgn="base">
+              <a:spcBef>
+                <a:spcPct val="0"/>
+              </a:spcBef>
+              <a:spcAft>
+                <a:spcPct val="0"/>
+              </a:spcAft>
+              <a:defRPr sz="3600">
+                <a:solidFill>
+                  <a:schemeClr val="tx1"/>
+                </a:solidFill>
+                <a:latin typeface="Arial" panose="020B0604020202020204" pitchFamily="34" charset="0"/>
+                <a:ea typeface="SimSun" panose="02010600030101010101" pitchFamily="2" charset="-122"/>
+              </a:defRPr>
+            </a:lvl2pPr>
+            <a:lvl3pPr algn="l" rtl="0" fontAlgn="base">
+              <a:spcBef>
+                <a:spcPct val="0"/>
+              </a:spcBef>
+              <a:spcAft>
+                <a:spcPct val="0"/>
+              </a:spcAft>
+              <a:defRPr sz="3600">
+                <a:solidFill>
+                  <a:schemeClr val="tx1"/>
+                </a:solidFill>
+                <a:latin typeface="Arial" panose="020B0604020202020204" pitchFamily="34" charset="0"/>
+                <a:ea typeface="SimSun" panose="02010600030101010101" pitchFamily="2" charset="-122"/>
+              </a:defRPr>
+            </a:lvl3pPr>
+            <a:lvl4pPr algn="l" rtl="0" fontAlgn="base">
+              <a:spcBef>
+                <a:spcPct val="0"/>
+              </a:spcBef>
+              <a:spcAft>
+                <a:spcPct val="0"/>
+              </a:spcAft>
+              <a:defRPr sz="3600">
+                <a:solidFill>
+                  <a:schemeClr val="tx1"/>
+                </a:solidFill>
+                <a:latin typeface="Arial" panose="020B0604020202020204" pitchFamily="34" charset="0"/>
+                <a:ea typeface="SimSun" panose="02010600030101010101" pitchFamily="2" charset="-122"/>
+              </a:defRPr>
+            </a:lvl4pPr>
+            <a:lvl5pPr algn="l" rtl="0" fontAlgn="base">
+              <a:spcBef>
+                <a:spcPct val="0"/>
+              </a:spcBef>
+              <a:spcAft>
+                <a:spcPct val="0"/>
+              </a:spcAft>
+              <a:defRPr sz="3600">
+                <a:solidFill>
+                  <a:schemeClr val="tx1"/>
+                </a:solidFill>
+                <a:latin typeface="Arial" panose="020B0604020202020204" pitchFamily="34" charset="0"/>
+                <a:ea typeface="SimSun" panose="02010600030101010101" pitchFamily="2" charset="-122"/>
+              </a:defRPr>
+            </a:lvl5pPr>
+            <a:lvl6pPr marL="457200" algn="l" rtl="0" fontAlgn="base">
+              <a:spcBef>
+                <a:spcPct val="0"/>
+              </a:spcBef>
+              <a:spcAft>
+                <a:spcPct val="0"/>
+              </a:spcAft>
+              <a:defRPr sz="3600">
+                <a:solidFill>
+                  <a:schemeClr val="tx1"/>
+                </a:solidFill>
+                <a:latin typeface="Arial" panose="020B0604020202020204" pitchFamily="34" charset="0"/>
+                <a:ea typeface="SimSun" panose="02010600030101010101" pitchFamily="2" charset="-122"/>
+              </a:defRPr>
+            </a:lvl6pPr>
+            <a:lvl7pPr marL="914400" algn="l" rtl="0" fontAlgn="base">
+              <a:spcBef>
+                <a:spcPct val="0"/>
+              </a:spcBef>
+              <a:spcAft>
+                <a:spcPct val="0"/>
+              </a:spcAft>
+              <a:defRPr sz="3600">
+                <a:solidFill>
+                  <a:schemeClr val="tx1"/>
+                </a:solidFill>
+                <a:latin typeface="Arial" panose="020B0604020202020204" pitchFamily="34" charset="0"/>
+                <a:ea typeface="SimSun" panose="02010600030101010101" pitchFamily="2" charset="-122"/>
+              </a:defRPr>
+            </a:lvl7pPr>
+            <a:lvl8pPr marL="1371600" algn="l" rtl="0" fontAlgn="base">
+              <a:spcBef>
+                <a:spcPct val="0"/>
+              </a:spcBef>
+              <a:spcAft>
+                <a:spcPct val="0"/>
+              </a:spcAft>
+              <a:defRPr sz="3600">
+                <a:solidFill>
+                  <a:schemeClr val="tx1"/>
+                </a:solidFill>
+                <a:latin typeface="Arial" panose="020B0604020202020204" pitchFamily="34" charset="0"/>
+                <a:ea typeface="SimSun" panose="02010600030101010101" pitchFamily="2" charset="-122"/>
+              </a:defRPr>
+            </a:lvl8pPr>
+            <a:lvl9pPr marL="1828800" algn="l" rtl="0" fontAlgn="base">
+              <a:spcBef>
+                <a:spcPct val="0"/>
+              </a:spcBef>
+              <a:spcAft>
+                <a:spcPct val="0"/>
+              </a:spcAft>
+              <a:defRPr sz="3600">
+                <a:solidFill>
+                  <a:schemeClr val="tx1"/>
+                </a:solidFill>
+                <a:latin typeface="Arial" panose="020B0604020202020204" pitchFamily="34" charset="0"/>
+                <a:ea typeface="SimSun" panose="02010600030101010101" pitchFamily="2" charset="-122"/>
+              </a:defRPr>
+            </a:lvl9pPr>
+          </a:lstStyle>
+          <a:p>
+            <a:pPr algn="ctr"/>
+            <a:r>
+              <a:rPr lang="en-US" altLang="zh-CN"/>
+              <a:t>Which Consequence is the Most Significant?</a:t>
+            </a:r>
+            <a:endParaRPr lang="zh-CN" altLang="en-US" dirty="0"/>
           </a:p>
         </p:txBody>
       </p:sp>

</xml_diff>